<commit_message>
Added Powerpoint updates to repository
</commit_message>
<xml_diff>
--- a/LA Crime Data Analysis 2020 - 2023.pptx
+++ b/LA Crime Data Analysis 2020 - 2023.pptx
@@ -7,8 +7,12 @@
   <p:sldIdLst>
     <p:sldId id="257" r:id="rId5"/>
     <p:sldId id="258" r:id="rId6"/>
-    <p:sldId id="259" r:id="rId7"/>
-    <p:sldId id="260" r:id="rId8"/>
+    <p:sldId id="264" r:id="rId7"/>
+    <p:sldId id="259" r:id="rId8"/>
+    <p:sldId id="260" r:id="rId9"/>
+    <p:sldId id="261" r:id="rId10"/>
+    <p:sldId id="262" r:id="rId11"/>
+    <p:sldId id="263" r:id="rId12"/>
   </p:sldIdLst>
   <p:sldSz cx="12192000" cy="6858000"/>
   <p:notesSz cx="6858000" cy="9144000"/>
@@ -4359,6 +4363,120 @@
           <p:cNvPr id="2" name="Title 1">
             <a:extLst>
               <a:ext uri="{FF2B5EF4-FFF2-40B4-BE49-F238E27FC236}">
+                <a16:creationId xmlns:a16="http://schemas.microsoft.com/office/drawing/2014/main" id="{E7D5E8DA-3FAF-B963-B2E0-C647187D1A7A}"/>
+              </a:ext>
+            </a:extLst>
+          </p:cNvPr>
+          <p:cNvSpPr>
+            <a:spLocks noGrp="1"/>
+          </p:cNvSpPr>
+          <p:nvPr>
+            <p:ph type="title"/>
+          </p:nvPr>
+        </p:nvSpPr>
+        <p:spPr>
+          <a:xfrm>
+            <a:off x="1097280" y="286604"/>
+            <a:ext cx="10058400" cy="949530"/>
+          </a:xfrm>
+        </p:spPr>
+        <p:txBody>
+          <a:bodyPr/>
+          <a:lstStyle/>
+          <a:p>
+            <a:pPr algn="ctr"/>
+            <a:r>
+              <a:rPr lang="en-US" dirty="0"/>
+              <a:t>Data Source</a:t>
+            </a:r>
+          </a:p>
+        </p:txBody>
+      </p:sp>
+      <p:sp>
+        <p:nvSpPr>
+          <p:cNvPr id="3" name="Content Placeholder 2">
+            <a:extLst>
+              <a:ext uri="{FF2B5EF4-FFF2-40B4-BE49-F238E27FC236}">
+                <a16:creationId xmlns:a16="http://schemas.microsoft.com/office/drawing/2014/main" id="{1FE51DED-4C02-8571-B2BF-1E7D8A6114B1}"/>
+              </a:ext>
+            </a:extLst>
+          </p:cNvPr>
+          <p:cNvSpPr>
+            <a:spLocks noGrp="1"/>
+          </p:cNvSpPr>
+          <p:nvPr>
+            <p:ph idx="1"/>
+          </p:nvPr>
+        </p:nvSpPr>
+        <p:spPr/>
+        <p:txBody>
+          <a:bodyPr>
+            <a:normAutofit/>
+          </a:bodyPr>
+          <a:lstStyle/>
+          <a:p>
+            <a:pPr algn="ctr"/>
+            <a:r>
+              <a:rPr lang="en-US" sz="2800" dirty="0"/>
+              <a:t>This dataset and the crime codes used to parse the data were sourced from City of Los Angeles, LA City Crime handbook at </a:t>
+            </a:r>
+            <a:r>
+              <a:rPr lang="en-US" sz="2800" dirty="0">
+                <a:hlinkClick r:id="rId2"/>
+              </a:rPr>
+              <a:t>https://data.lacity.org/Public-Safety</a:t>
+            </a:r>
+            <a:endParaRPr lang="en-US" sz="2800" dirty="0"/>
+          </a:p>
+          <a:p>
+            <a:pPr algn="ctr"/>
+            <a:r>
+              <a:rPr lang="en-US" sz="2800" dirty="0"/>
+              <a:t>The data set Crime_Data_from_2020_to_Present.csv was used to look at violent crimes versus non-violent crimes during the Covid 19 California Lockdown in LA</a:t>
+            </a:r>
+            <a:r>
+              <a:rPr lang="en-US" sz="2800"/>
+              <a:t>. </a:t>
+            </a:r>
+            <a:endParaRPr lang="en-US" sz="2800" dirty="0"/>
+          </a:p>
+        </p:txBody>
+      </p:sp>
+    </p:spTree>
+    <p:extLst>
+      <p:ext uri="{BB962C8B-B14F-4D97-AF65-F5344CB8AC3E}">
+        <p14:creationId xmlns:p14="http://schemas.microsoft.com/office/powerpoint/2010/main" val="244233376"/>
+      </p:ext>
+    </p:extLst>
+  </p:cSld>
+  <p:clrMapOvr>
+    <a:masterClrMapping/>
+  </p:clrMapOvr>
+</p:sld>
+</file>
+
+<file path=ppt/slides/slide4.xml><?xml version="1.0" encoding="utf-8"?>
+<p:sld xmlns:a="http://schemas.openxmlformats.org/drawingml/2006/main" xmlns:r="http://schemas.openxmlformats.org/officeDocument/2006/relationships" xmlns:p="http://schemas.openxmlformats.org/presentationml/2006/main">
+  <p:cSld>
+    <p:spTree>
+      <p:nvGrpSpPr>
+        <p:cNvPr id="1" name=""/>
+        <p:cNvGrpSpPr/>
+        <p:nvPr/>
+      </p:nvGrpSpPr>
+      <p:grpSpPr>
+        <a:xfrm>
+          <a:off x="0" y="0"/>
+          <a:ext cx="0" cy="0"/>
+          <a:chOff x="0" y="0"/>
+          <a:chExt cx="0" cy="0"/>
+        </a:xfrm>
+      </p:grpSpPr>
+      <p:sp>
+        <p:nvSpPr>
+          <p:cNvPr id="2" name="Title 1">
+            <a:extLst>
+              <a:ext uri="{FF2B5EF4-FFF2-40B4-BE49-F238E27FC236}">
                 <a16:creationId xmlns:a16="http://schemas.microsoft.com/office/drawing/2014/main" id="{F3D51488-6DAD-11EE-15EF-FDDB237A0DF6}"/>
               </a:ext>
             </a:extLst>
@@ -4412,7 +4530,7 @@
           <a:p>
             <a:r>
               <a:rPr lang="en-US" dirty="0"/>
-              <a:t>Phil Klimkewicz dissected the covid data from the full set of data to determine if violent crimes were lower or higher during the California covid lockdown. The first graph show the average violent crime for each year. </a:t>
+              <a:t>We dissected the covid data from the full set of data to determine if violent crimes were lower or higher during the California covid lockdown. The first graph show the average violent crime for each year. </a:t>
             </a:r>
           </a:p>
         </p:txBody>
@@ -4460,7 +4578,7 @@
 </p:sld>
 </file>
 
-<file path=ppt/slides/slide4.xml><?xml version="1.0" encoding="utf-8"?>
+<file path=ppt/slides/slide5.xml><?xml version="1.0" encoding="utf-8"?>
 <p:sld xmlns:a="http://schemas.openxmlformats.org/drawingml/2006/main" xmlns:r="http://schemas.openxmlformats.org/officeDocument/2006/relationships" xmlns:p="http://schemas.openxmlformats.org/presentationml/2006/main">
   <p:cSld>
     <p:spTree>
@@ -4537,15 +4655,7 @@
           <a:p>
             <a:r>
               <a:rPr lang="en-US" sz="1200" dirty="0"/>
-              <a:t>Based on the first slide you may think that the average violent crime per month in 202 was lower which may indicate that violent crime for the covid lockdown may have had an impact. The second graph does who that the average violent </a:t>
-            </a:r>
-            <a:r>
-              <a:rPr lang="en-US" sz="1200" dirty="0" err="1"/>
-              <a:t>crome</a:t>
-            </a:r>
-            <a:r>
-              <a:rPr lang="en-US" sz="1200" dirty="0"/>
-              <a:t> that occurred during the time of the Covid Lockdown was significantly lower that the average for other moths that were not during the covid lockdown.</a:t>
+              <a:t>Based on the first slide you may think that the average violent crime per month in 202 was lower which may indicate that violent crime for the covid lockdown may have had an impact. The second graph does who that the average violent crime that occurred during the time of the Covid Lockdown was significantly lower that the average for other moths that were not during the covid lockdown.</a:t>
             </a:r>
           </a:p>
         </p:txBody>
@@ -4584,6 +4694,292 @@
     <p:extLst>
       <p:ext uri="{BB962C8B-B14F-4D97-AF65-F5344CB8AC3E}">
         <p14:creationId xmlns:p14="http://schemas.microsoft.com/office/powerpoint/2010/main" val="801566292"/>
+      </p:ext>
+    </p:extLst>
+  </p:cSld>
+  <p:clrMapOvr>
+    <a:masterClrMapping/>
+  </p:clrMapOvr>
+</p:sld>
+</file>
+
+<file path=ppt/slides/slide6.xml><?xml version="1.0" encoding="utf-8"?>
+<p:sld xmlns:a="http://schemas.openxmlformats.org/drawingml/2006/main" xmlns:r="http://schemas.openxmlformats.org/officeDocument/2006/relationships" xmlns:p="http://schemas.openxmlformats.org/presentationml/2006/main">
+  <p:cSld>
+    <p:spTree>
+      <p:nvGrpSpPr>
+        <p:cNvPr id="1" name=""/>
+        <p:cNvGrpSpPr/>
+        <p:nvPr/>
+      </p:nvGrpSpPr>
+      <p:grpSpPr>
+        <a:xfrm>
+          <a:off x="0" y="0"/>
+          <a:ext cx="0" cy="0"/>
+          <a:chOff x="0" y="0"/>
+          <a:chExt cx="0" cy="0"/>
+        </a:xfrm>
+      </p:grpSpPr>
+      <p:sp>
+        <p:nvSpPr>
+          <p:cNvPr id="2" name="Title 1">
+            <a:extLst>
+              <a:ext uri="{FF2B5EF4-FFF2-40B4-BE49-F238E27FC236}">
+                <a16:creationId xmlns:a16="http://schemas.microsoft.com/office/drawing/2014/main" id="{25E7C6C4-32B9-BC67-4B91-212D70DF5656}"/>
+              </a:ext>
+            </a:extLst>
+          </p:cNvPr>
+          <p:cNvSpPr>
+            <a:spLocks noGrp="1"/>
+          </p:cNvSpPr>
+          <p:nvPr>
+            <p:ph type="title"/>
+          </p:nvPr>
+        </p:nvSpPr>
+        <p:spPr/>
+        <p:txBody>
+          <a:bodyPr/>
+          <a:lstStyle/>
+          <a:p>
+            <a:r>
+              <a:rPr lang="en-US" dirty="0"/>
+              <a:t>Violent Crime by Location and Sorted by Year and age &lt;30</a:t>
+            </a:r>
+          </a:p>
+        </p:txBody>
+      </p:sp>
+      <p:sp>
+        <p:nvSpPr>
+          <p:cNvPr id="8" name="Content Placeholder 7">
+            <a:extLst>
+              <a:ext uri="{FF2B5EF4-FFF2-40B4-BE49-F238E27FC236}">
+                <a16:creationId xmlns:a16="http://schemas.microsoft.com/office/drawing/2014/main" id="{0A3F41E0-99B9-AD4F-ED0D-24FFC54E1F17}"/>
+              </a:ext>
+            </a:extLst>
+          </p:cNvPr>
+          <p:cNvSpPr>
+            <a:spLocks noGrp="1"/>
+          </p:cNvSpPr>
+          <p:nvPr>
+            <p:ph idx="1"/>
+          </p:nvPr>
+        </p:nvSpPr>
+        <p:spPr/>
+        <p:txBody>
+          <a:bodyPr/>
+          <a:lstStyle/>
+          <a:p>
+            <a:endParaRPr lang="en-US"/>
+          </a:p>
+        </p:txBody>
+      </p:sp>
+    </p:spTree>
+    <p:extLst>
+      <p:ext uri="{BB962C8B-B14F-4D97-AF65-F5344CB8AC3E}">
+        <p14:creationId xmlns:p14="http://schemas.microsoft.com/office/powerpoint/2010/main" val="4236885135"/>
+      </p:ext>
+    </p:extLst>
+  </p:cSld>
+  <p:clrMapOvr>
+    <a:masterClrMapping/>
+  </p:clrMapOvr>
+</p:sld>
+</file>
+
+<file path=ppt/slides/slide7.xml><?xml version="1.0" encoding="utf-8"?>
+<p:sld xmlns:a="http://schemas.openxmlformats.org/drawingml/2006/main" xmlns:r="http://schemas.openxmlformats.org/officeDocument/2006/relationships" xmlns:p="http://schemas.openxmlformats.org/presentationml/2006/main">
+  <p:cSld>
+    <p:spTree>
+      <p:nvGrpSpPr>
+        <p:cNvPr id="1" name=""/>
+        <p:cNvGrpSpPr/>
+        <p:nvPr/>
+      </p:nvGrpSpPr>
+      <p:grpSpPr>
+        <a:xfrm>
+          <a:off x="0" y="0"/>
+          <a:ext cx="0" cy="0"/>
+          <a:chOff x="0" y="0"/>
+          <a:chExt cx="0" cy="0"/>
+        </a:xfrm>
+      </p:grpSpPr>
+      <p:sp>
+        <p:nvSpPr>
+          <p:cNvPr id="2" name="Title 1">
+            <a:extLst>
+              <a:ext uri="{FF2B5EF4-FFF2-40B4-BE49-F238E27FC236}">
+                <a16:creationId xmlns:a16="http://schemas.microsoft.com/office/drawing/2014/main" id="{0E2D8F38-31D6-1C50-6EA9-B5BBEA7BBC06}"/>
+              </a:ext>
+            </a:extLst>
+          </p:cNvPr>
+          <p:cNvSpPr>
+            <a:spLocks noGrp="1"/>
+          </p:cNvSpPr>
+          <p:nvPr>
+            <p:ph type="title"/>
+          </p:nvPr>
+        </p:nvSpPr>
+        <p:spPr>
+          <a:xfrm>
+            <a:off x="876300" y="286603"/>
+            <a:ext cx="10279380" cy="1338997"/>
+          </a:xfrm>
+        </p:spPr>
+        <p:txBody>
+          <a:bodyPr>
+            <a:noAutofit/>
+          </a:bodyPr>
+          <a:lstStyle/>
+          <a:p>
+            <a:pPr algn="ctr"/>
+            <a:r>
+              <a:rPr lang="en-US" sz="4000" dirty="0"/>
+              <a:t>Number of Violent vs non-Violent Crimes </a:t>
+            </a:r>
+            <a:br>
+              <a:rPr lang="en-US" sz="4000" dirty="0"/>
+            </a:br>
+            <a:r>
+              <a:rPr lang="en-US" sz="4000" dirty="0"/>
+              <a:t>per Month </a:t>
+            </a:r>
+          </a:p>
+        </p:txBody>
+      </p:sp>
+      <p:pic>
+        <p:nvPicPr>
+          <p:cNvPr id="7" name="Content Placeholder 6">
+            <a:extLst>
+              <a:ext uri="{FF2B5EF4-FFF2-40B4-BE49-F238E27FC236}">
+                <a16:creationId xmlns:a16="http://schemas.microsoft.com/office/drawing/2014/main" id="{CA8EDEDD-35F7-0920-7391-BBA8A104B379}"/>
+              </a:ext>
+            </a:extLst>
+          </p:cNvPr>
+          <p:cNvPicPr>
+            <a:picLocks noGrp="1" noChangeAspect="1"/>
+          </p:cNvPicPr>
+          <p:nvPr>
+            <p:ph idx="1"/>
+          </p:nvPr>
+        </p:nvPicPr>
+        <p:blipFill>
+          <a:blip r:embed="rId2"/>
+          <a:stretch>
+            <a:fillRect/>
+          </a:stretch>
+        </p:blipFill>
+        <p:spPr>
+          <a:xfrm>
+            <a:off x="774700" y="1905000"/>
+            <a:ext cx="9931399" cy="4445000"/>
+          </a:xfrm>
+          <a:prstGeom prst="rect">
+            <a:avLst/>
+          </a:prstGeom>
+        </p:spPr>
+      </p:pic>
+    </p:spTree>
+    <p:extLst>
+      <p:ext uri="{BB962C8B-B14F-4D97-AF65-F5344CB8AC3E}">
+        <p14:creationId xmlns:p14="http://schemas.microsoft.com/office/powerpoint/2010/main" val="2710409759"/>
+      </p:ext>
+    </p:extLst>
+  </p:cSld>
+  <p:clrMapOvr>
+    <a:masterClrMapping/>
+  </p:clrMapOvr>
+</p:sld>
+</file>
+
+<file path=ppt/slides/slide8.xml><?xml version="1.0" encoding="utf-8"?>
+<p:sld xmlns:a="http://schemas.openxmlformats.org/drawingml/2006/main" xmlns:r="http://schemas.openxmlformats.org/officeDocument/2006/relationships" xmlns:p="http://schemas.openxmlformats.org/presentationml/2006/main">
+  <p:cSld>
+    <p:spTree>
+      <p:nvGrpSpPr>
+        <p:cNvPr id="1" name=""/>
+        <p:cNvGrpSpPr/>
+        <p:nvPr/>
+      </p:nvGrpSpPr>
+      <p:grpSpPr>
+        <a:xfrm>
+          <a:off x="0" y="0"/>
+          <a:ext cx="0" cy="0"/>
+          <a:chOff x="0" y="0"/>
+          <a:chExt cx="0" cy="0"/>
+        </a:xfrm>
+      </p:grpSpPr>
+      <p:sp>
+        <p:nvSpPr>
+          <p:cNvPr id="2" name="Title 1">
+            <a:extLst>
+              <a:ext uri="{FF2B5EF4-FFF2-40B4-BE49-F238E27FC236}">
+                <a16:creationId xmlns:a16="http://schemas.microsoft.com/office/drawing/2014/main" id="{747C700F-A969-166E-D2F3-CDFA8957BA3D}"/>
+              </a:ext>
+            </a:extLst>
+          </p:cNvPr>
+          <p:cNvSpPr>
+            <a:spLocks noGrp="1"/>
+          </p:cNvSpPr>
+          <p:nvPr>
+            <p:ph type="title"/>
+          </p:nvPr>
+        </p:nvSpPr>
+        <p:spPr>
+          <a:xfrm>
+            <a:off x="1097280" y="482599"/>
+            <a:ext cx="10058400" cy="1049867"/>
+          </a:xfrm>
+        </p:spPr>
+        <p:txBody>
+          <a:bodyPr>
+            <a:normAutofit fontScale="90000"/>
+          </a:bodyPr>
+          <a:lstStyle/>
+          <a:p>
+            <a:pPr algn="ctr"/>
+            <a:r>
+              <a:rPr lang="en-US" dirty="0"/>
+              <a:t>Crimes in Outside of Covid Lockdown by Area</a:t>
+            </a:r>
+          </a:p>
+        </p:txBody>
+      </p:sp>
+      <p:pic>
+        <p:nvPicPr>
+          <p:cNvPr id="4" name="Content Placeholder 3">
+            <a:extLst>
+              <a:ext uri="{FF2B5EF4-FFF2-40B4-BE49-F238E27FC236}">
+                <a16:creationId xmlns:a16="http://schemas.microsoft.com/office/drawing/2014/main" id="{DDE6A5D5-F5D7-39EC-1933-09FFB457C7B5}"/>
+              </a:ext>
+            </a:extLst>
+          </p:cNvPr>
+          <p:cNvPicPr>
+            <a:picLocks noGrp="1" noChangeAspect="1"/>
+          </p:cNvPicPr>
+          <p:nvPr>
+            <p:ph idx="1"/>
+          </p:nvPr>
+        </p:nvPicPr>
+        <p:blipFill>
+          <a:blip r:embed="rId2"/>
+          <a:stretch>
+            <a:fillRect/>
+          </a:stretch>
+        </p:blipFill>
+        <p:spPr>
+          <a:xfrm>
+            <a:off x="1371600" y="1981200"/>
+            <a:ext cx="9537700" cy="4394200"/>
+          </a:xfrm>
+          <a:prstGeom prst="rect">
+            <a:avLst/>
+          </a:prstGeom>
+        </p:spPr>
+      </p:pic>
+    </p:spTree>
+    <p:extLst>
+      <p:ext uri="{BB962C8B-B14F-4D97-AF65-F5344CB8AC3E}">
+        <p14:creationId xmlns:p14="http://schemas.microsoft.com/office/powerpoint/2010/main" val="1859457333"/>
       </p:ext>
     </p:extLst>
   </p:cSld>
@@ -4877,35 +5273,6 @@
 </file>
 
 <file path=customXml/item1.xml><?xml version="1.0" encoding="utf-8"?>
-<p:properties xmlns:p="http://schemas.microsoft.com/office/2006/metadata/properties" xmlns:xsi="http://www.w3.org/2001/XMLSchema-instance" xmlns:pc="http://schemas.microsoft.com/office/infopath/2007/PartnerControls">
-  <documentManagement>
-    <_ip_UnifiedCompliancePolicyUIAction xmlns="http://schemas.microsoft.com/sharepoint/v3" xsi:nil="true"/>
-    <Image xmlns="71af3243-3dd4-4a8d-8c0d-dd76da1f02a5">
-      <Url xsi:nil="true"/>
-      <Description xsi:nil="true"/>
-    </Image>
-    <Status xmlns="71af3243-3dd4-4a8d-8c0d-dd76da1f02a5">Not started</Status>
-    <Background xmlns="71af3243-3dd4-4a8d-8c0d-dd76da1f02a5">false</Background>
-    <_ip_UnifiedCompliancePolicyProperties xmlns="http://schemas.microsoft.com/sharepoint/v3" xsi:nil="true"/>
-    <ImageTagsTaxHTField xmlns="71af3243-3dd4-4a8d-8c0d-dd76da1f02a5">
-      <Terms xmlns="http://schemas.microsoft.com/office/infopath/2007/PartnerControls"/>
-    </ImageTagsTaxHTField>
-    <TaxCatchAll xmlns="230e9df3-be65-4c73-a93b-d1236ebd677e" xsi:nil="true"/>
-    <MediaServiceKeyPoints xmlns="71af3243-3dd4-4a8d-8c0d-dd76da1f02a5" xsi:nil="true"/>
-  </documentManagement>
-</p:properties>
-</file>
-
-<file path=customXml/item2.xml><?xml version="1.0" encoding="utf-8"?>
-<?mso-contentType ?>
-<FormTemplates xmlns="http://schemas.microsoft.com/sharepoint/v3/contenttype/forms">
-  <Display>DocumentLibraryForm</Display>
-  <Edit>DocumentLibraryForm</Edit>
-  <New>DocumentLibraryForm</New>
-</FormTemplates>
-</file>
-
-<file path=customXml/item3.xml><?xml version="1.0" encoding="utf-8"?>
 <ct:contentTypeSchema xmlns:ct="http://schemas.microsoft.com/office/2006/metadata/contentType" xmlns:ma="http://schemas.microsoft.com/office/2006/metadata/properties/metaAttributes" ct:_="" ma:_="" ma:contentTypeName="Document" ma:contentTypeID="0x01010079F111ED35F8CC479449609E8A0923A6" ma:contentTypeVersion="27" ma:contentTypeDescription="Create a new document." ma:contentTypeScope="" ma:versionID="c6f9a84f66a9c8b9a21755b9ffafb945">
   <xsd:schema xmlns:xsd="http://www.w3.org/2001/XMLSchema" xmlns:xs="http://www.w3.org/2001/XMLSchema" xmlns:p="http://schemas.microsoft.com/office/2006/metadata/properties" xmlns:ns1="http://schemas.microsoft.com/sharepoint/v3" xmlns:ns2="71af3243-3dd4-4a8d-8c0d-dd76da1f02a5" xmlns:ns3="16c05727-aa75-4e4a-9b5f-8a80a1165891" xmlns:ns4="230e9df3-be65-4c73-a93b-d1236ebd677e" targetNamespace="http://schemas.microsoft.com/office/2006/metadata/properties" ma:root="true" ma:fieldsID="27df39e3e7036dff54f89ddd5805ce72" ns1:_="" ns2:_="" ns3:_="" ns4:_="">
     <xsd:import namespace="http://schemas.microsoft.com/sharepoint/v3"/>
@@ -5211,27 +5578,36 @@
 </ct:contentTypeSchema>
 </file>
 
-<file path=customXml/itemProps1.xml><?xml version="1.0" encoding="utf-8"?>
-<ds:datastoreItem xmlns:ds="http://schemas.openxmlformats.org/officeDocument/2006/customXml" ds:itemID="{6F4F4D41-822D-40F2-A7AC-E4E6CB36CA7A}">
-  <ds:schemaRefs>
-    <ds:schemaRef ds:uri="http://schemas.microsoft.com/office/2006/metadata/properties"/>
-    <ds:schemaRef ds:uri="http://schemas.microsoft.com/office/infopath/2007/PartnerControls"/>
-    <ds:schemaRef ds:uri="http://schemas.microsoft.com/sharepoint/v3"/>
-    <ds:schemaRef ds:uri="71af3243-3dd4-4a8d-8c0d-dd76da1f02a5"/>
-    <ds:schemaRef ds:uri="230e9df3-be65-4c73-a93b-d1236ebd677e"/>
-  </ds:schemaRefs>
-</ds:datastoreItem>
+<file path=customXml/item2.xml><?xml version="1.0" encoding="utf-8"?>
+<?mso-contentType ?>
+<FormTemplates xmlns="http://schemas.microsoft.com/sharepoint/v3/contenttype/forms">
+  <Display>DocumentLibraryForm</Display>
+  <Edit>DocumentLibraryForm</Edit>
+  <New>DocumentLibraryForm</New>
+</FormTemplates>
 </file>
 
-<file path=customXml/itemProps2.xml><?xml version="1.0" encoding="utf-8"?>
-<ds:datastoreItem xmlns:ds="http://schemas.openxmlformats.org/officeDocument/2006/customXml" ds:itemID="{19DAD249-BF80-48EF-9AFB-36A11BCDC2CE}">
-  <ds:schemaRefs>
-    <ds:schemaRef ds:uri="http://schemas.microsoft.com/sharepoint/v3/contenttype/forms"/>
-  </ds:schemaRefs>
-</ds:datastoreItem>
+<file path=customXml/item3.xml><?xml version="1.0" encoding="utf-8"?>
+<p:properties xmlns:p="http://schemas.microsoft.com/office/2006/metadata/properties" xmlns:xsi="http://www.w3.org/2001/XMLSchema-instance" xmlns:pc="http://schemas.microsoft.com/office/infopath/2007/PartnerControls">
+  <documentManagement>
+    <_ip_UnifiedCompliancePolicyUIAction xmlns="http://schemas.microsoft.com/sharepoint/v3" xsi:nil="true"/>
+    <Image xmlns="71af3243-3dd4-4a8d-8c0d-dd76da1f02a5">
+      <Url xsi:nil="true"/>
+      <Description xsi:nil="true"/>
+    </Image>
+    <Status xmlns="71af3243-3dd4-4a8d-8c0d-dd76da1f02a5">Not started</Status>
+    <Background xmlns="71af3243-3dd4-4a8d-8c0d-dd76da1f02a5">false</Background>
+    <_ip_UnifiedCompliancePolicyProperties xmlns="http://schemas.microsoft.com/sharepoint/v3" xsi:nil="true"/>
+    <ImageTagsTaxHTField xmlns="71af3243-3dd4-4a8d-8c0d-dd76da1f02a5">
+      <Terms xmlns="http://schemas.microsoft.com/office/infopath/2007/PartnerControls"/>
+    </ImageTagsTaxHTField>
+    <TaxCatchAll xmlns="230e9df3-be65-4c73-a93b-d1236ebd677e" xsi:nil="true"/>
+    <MediaServiceKeyPoints xmlns="71af3243-3dd4-4a8d-8c0d-dd76da1f02a5" xsi:nil="true"/>
+  </documentManagement>
+</p:properties>
 </file>
 
-<file path=customXml/itemProps3.xml><?xml version="1.0" encoding="utf-8"?>
+<file path=customXml/itemProps1.xml><?xml version="1.0" encoding="utf-8"?>
 <ds:datastoreItem xmlns:ds="http://schemas.openxmlformats.org/officeDocument/2006/customXml" ds:itemID="{C5A59D56-2157-4202-9D02-F44E447A241D}">
   <ds:schemaRefs>
     <ds:schemaRef ds:uri="http://schemas.microsoft.com/office/2006/metadata/contentType"/>
@@ -5250,4 +5626,24 @@
     <ds:schemaRef ds:uri="http://schemas.microsoft.com/internal/obd"/>
   </ds:schemaRefs>
 </ds:datastoreItem>
+</file>
+
+<file path=customXml/itemProps2.xml><?xml version="1.0" encoding="utf-8"?>
+<ds:datastoreItem xmlns:ds="http://schemas.openxmlformats.org/officeDocument/2006/customXml" ds:itemID="{19DAD249-BF80-48EF-9AFB-36A11BCDC2CE}">
+  <ds:schemaRefs>
+    <ds:schemaRef ds:uri="http://schemas.microsoft.com/sharepoint/v3/contenttype/forms"/>
+  </ds:schemaRefs>
+</ds:datastoreItem>
+</file>
+
+<file path=customXml/itemProps3.xml><?xml version="1.0" encoding="utf-8"?>
+<ds:datastoreItem xmlns:ds="http://schemas.openxmlformats.org/officeDocument/2006/customXml" ds:itemID="{6F4F4D41-822D-40F2-A7AC-E4E6CB36CA7A}">
+  <ds:schemaRefs>
+    <ds:schemaRef ds:uri="http://schemas.microsoft.com/office/2006/metadata/properties"/>
+    <ds:schemaRef ds:uri="http://schemas.microsoft.com/office/infopath/2007/PartnerControls"/>
+    <ds:schemaRef ds:uri="http://schemas.microsoft.com/sharepoint/v3"/>
+    <ds:schemaRef ds:uri="71af3243-3dd4-4a8d-8c0d-dd76da1f02a5"/>
+    <ds:schemaRef ds:uri="230e9df3-be65-4c73-a93b-d1236ebd677e"/>
+  </ds:schemaRefs>
+</ds:datastoreItem>
 </file>
</xml_diff>